<commit_message>
Updates to CSV IndyRB talk
</commit_message>
<xml_diff>
--- a/presentations/indyrb/2018-07/csv.pptx
+++ b/presentations/indyrb/2018-07/csv.pptx
@@ -12,14 +12,16 @@
     <p:sldId id="260" r:id="rId6"/>
     <p:sldId id="261" r:id="rId7"/>
     <p:sldId id="262" r:id="rId8"/>
-    <p:sldId id="265" r:id="rId9"/>
-    <p:sldId id="263" r:id="rId10"/>
-    <p:sldId id="264" r:id="rId11"/>
-    <p:sldId id="266" r:id="rId12"/>
-    <p:sldId id="267" r:id="rId13"/>
-    <p:sldId id="268" r:id="rId14"/>
-    <p:sldId id="269" r:id="rId15"/>
-    <p:sldId id="271" r:id="rId16"/>
+    <p:sldId id="273" r:id="rId9"/>
+    <p:sldId id="265" r:id="rId10"/>
+    <p:sldId id="263" r:id="rId11"/>
+    <p:sldId id="264" r:id="rId12"/>
+    <p:sldId id="266" r:id="rId13"/>
+    <p:sldId id="267" r:id="rId14"/>
+    <p:sldId id="268" r:id="rId15"/>
+    <p:sldId id="269" r:id="rId16"/>
+    <p:sldId id="272" r:id="rId17"/>
+    <p:sldId id="271" r:id="rId18"/>
   </p:sldIdLst>
   <p:sldSz cx="12192000" cy="6858000"/>
   <p:notesSz cx="6858000" cy="9144000"/>
@@ -273,7 +275,7 @@
           <a:p>
             <a:fld id="{C29F0C91-2C78-A94B-8D44-8D33962942BB}" type="datetimeFigureOut">
               <a:rPr lang="en-US" smtClean="0"/>
-              <a:t>7/10/18</a:t>
+              <a:t>7/11/18</a:t>
             </a:fld>
             <a:endParaRPr lang="en-US"/>
           </a:p>
@@ -471,7 +473,7 @@
           <a:p>
             <a:fld id="{C29F0C91-2C78-A94B-8D44-8D33962942BB}" type="datetimeFigureOut">
               <a:rPr lang="en-US" smtClean="0"/>
-              <a:t>7/10/18</a:t>
+              <a:t>7/11/18</a:t>
             </a:fld>
             <a:endParaRPr lang="en-US"/>
           </a:p>
@@ -679,7 +681,7 @@
           <a:p>
             <a:fld id="{C29F0C91-2C78-A94B-8D44-8D33962942BB}" type="datetimeFigureOut">
               <a:rPr lang="en-US" smtClean="0"/>
-              <a:t>7/10/18</a:t>
+              <a:t>7/11/18</a:t>
             </a:fld>
             <a:endParaRPr lang="en-US"/>
           </a:p>
@@ -877,7 +879,7 @@
           <a:p>
             <a:fld id="{C29F0C91-2C78-A94B-8D44-8D33962942BB}" type="datetimeFigureOut">
               <a:rPr lang="en-US" smtClean="0"/>
-              <a:t>7/10/18</a:t>
+              <a:t>7/11/18</a:t>
             </a:fld>
             <a:endParaRPr lang="en-US"/>
           </a:p>
@@ -1152,7 +1154,7 @@
           <a:p>
             <a:fld id="{C29F0C91-2C78-A94B-8D44-8D33962942BB}" type="datetimeFigureOut">
               <a:rPr lang="en-US" smtClean="0"/>
-              <a:t>7/10/18</a:t>
+              <a:t>7/11/18</a:t>
             </a:fld>
             <a:endParaRPr lang="en-US"/>
           </a:p>
@@ -1417,7 +1419,7 @@
           <a:p>
             <a:fld id="{C29F0C91-2C78-A94B-8D44-8D33962942BB}" type="datetimeFigureOut">
               <a:rPr lang="en-US" smtClean="0"/>
-              <a:t>7/10/18</a:t>
+              <a:t>7/11/18</a:t>
             </a:fld>
             <a:endParaRPr lang="en-US"/>
           </a:p>
@@ -1829,7 +1831,7 @@
           <a:p>
             <a:fld id="{C29F0C91-2C78-A94B-8D44-8D33962942BB}" type="datetimeFigureOut">
               <a:rPr lang="en-US" smtClean="0"/>
-              <a:t>7/10/18</a:t>
+              <a:t>7/11/18</a:t>
             </a:fld>
             <a:endParaRPr lang="en-US"/>
           </a:p>
@@ -1970,7 +1972,7 @@
           <a:p>
             <a:fld id="{C29F0C91-2C78-A94B-8D44-8D33962942BB}" type="datetimeFigureOut">
               <a:rPr lang="en-US" smtClean="0"/>
-              <a:t>7/10/18</a:t>
+              <a:t>7/11/18</a:t>
             </a:fld>
             <a:endParaRPr lang="en-US"/>
           </a:p>
@@ -2083,7 +2085,7 @@
           <a:p>
             <a:fld id="{C29F0C91-2C78-A94B-8D44-8D33962942BB}" type="datetimeFigureOut">
               <a:rPr lang="en-US" smtClean="0"/>
-              <a:t>7/10/18</a:t>
+              <a:t>7/11/18</a:t>
             </a:fld>
             <a:endParaRPr lang="en-US"/>
           </a:p>
@@ -2394,7 +2396,7 @@
           <a:p>
             <a:fld id="{C29F0C91-2C78-A94B-8D44-8D33962942BB}" type="datetimeFigureOut">
               <a:rPr lang="en-US" smtClean="0"/>
-              <a:t>7/10/18</a:t>
+              <a:t>7/11/18</a:t>
             </a:fld>
             <a:endParaRPr lang="en-US"/>
           </a:p>
@@ -2682,7 +2684,7 @@
           <a:p>
             <a:fld id="{C29F0C91-2C78-A94B-8D44-8D33962942BB}" type="datetimeFigureOut">
               <a:rPr lang="en-US" smtClean="0"/>
-              <a:t>7/10/18</a:t>
+              <a:t>7/11/18</a:t>
             </a:fld>
             <a:endParaRPr lang="en-US"/>
           </a:p>
@@ -2923,7 +2925,7 @@
           <a:p>
             <a:fld id="{C29F0C91-2C78-A94B-8D44-8D33962942BB}" type="datetimeFigureOut">
               <a:rPr lang="en-US" smtClean="0"/>
-              <a:t>7/10/18</a:t>
+              <a:t>7/11/18</a:t>
             </a:fld>
             <a:endParaRPr lang="en-US"/>
           </a:p>
@@ -3485,6 +3487,94 @@
       </p:sp>
       <p:pic>
         <p:nvPicPr>
+          <p:cNvPr id="8" name="Picture 7">
+            <a:extLst>
+              <a:ext uri="{FF2B5EF4-FFF2-40B4-BE49-F238E27FC236}">
+                <a16:creationId xmlns:a16="http://schemas.microsoft.com/office/drawing/2014/main" id="{8BF0EF9F-5D2B-6040-B9C2-84563DA8FD26}"/>
+              </a:ext>
+            </a:extLst>
+          </p:cNvPr>
+          <p:cNvPicPr>
+            <a:picLocks noChangeAspect="1"/>
+          </p:cNvPicPr>
+          <p:nvPr/>
+        </p:nvPicPr>
+        <p:blipFill>
+          <a:blip r:embed="rId2"/>
+          <a:stretch>
+            <a:fillRect/>
+          </a:stretch>
+        </p:blipFill>
+        <p:spPr>
+          <a:xfrm>
+            <a:off x="1560782" y="2245384"/>
+            <a:ext cx="8242300" cy="2781300"/>
+          </a:xfrm>
+          <a:prstGeom prst="rect">
+            <a:avLst/>
+          </a:prstGeom>
+        </p:spPr>
+      </p:pic>
+    </p:spTree>
+    <p:extLst>
+      <p:ext uri="{BB962C8B-B14F-4D97-AF65-F5344CB8AC3E}">
+        <p14:creationId xmlns:p14="http://schemas.microsoft.com/office/powerpoint/2010/main" val="3172978648"/>
+      </p:ext>
+    </p:extLst>
+  </p:cSld>
+  <p:clrMapOvr>
+    <a:masterClrMapping/>
+  </p:clrMapOvr>
+</p:sld>
+</file>
+
+<file path=ppt/slides/slide11.xml><?xml version="1.0" encoding="utf-8"?>
+<p:sld xmlns:a="http://schemas.openxmlformats.org/drawingml/2006/main" xmlns:r="http://schemas.openxmlformats.org/officeDocument/2006/relationships" xmlns:p="http://schemas.openxmlformats.org/presentationml/2006/main">
+  <p:cSld>
+    <p:spTree>
+      <p:nvGrpSpPr>
+        <p:cNvPr id="1" name=""/>
+        <p:cNvGrpSpPr/>
+        <p:nvPr/>
+      </p:nvGrpSpPr>
+      <p:grpSpPr>
+        <a:xfrm>
+          <a:off x="0" y="0"/>
+          <a:ext cx="0" cy="0"/>
+          <a:chOff x="0" y="0"/>
+          <a:chExt cx="0" cy="0"/>
+        </a:xfrm>
+      </p:grpSpPr>
+      <p:sp>
+        <p:nvSpPr>
+          <p:cNvPr id="2" name="Title 1">
+            <a:extLst>
+              <a:ext uri="{FF2B5EF4-FFF2-40B4-BE49-F238E27FC236}">
+                <a16:creationId xmlns:a16="http://schemas.microsoft.com/office/drawing/2014/main" id="{FE97A094-BE3F-B945-8159-1B3C3E1C0B05}"/>
+              </a:ext>
+            </a:extLst>
+          </p:cNvPr>
+          <p:cNvSpPr>
+            <a:spLocks noGrp="1"/>
+          </p:cNvSpPr>
+          <p:nvPr>
+            <p:ph type="title"/>
+          </p:nvPr>
+        </p:nvSpPr>
+        <p:spPr/>
+        <p:txBody>
+          <a:bodyPr/>
+          <a:lstStyle/>
+          <a:p>
+            <a:r>
+              <a:rPr lang="en-US" dirty="0"/>
+              <a:t>Reading a File</a:t>
+            </a:r>
+          </a:p>
+        </p:txBody>
+      </p:sp>
+      <p:pic>
+        <p:nvPicPr>
           <p:cNvPr id="4" name="Picture 3">
             <a:extLst>
               <a:ext uri="{FF2B5EF4-FFF2-40B4-BE49-F238E27FC236}">
@@ -3526,7 +3616,7 @@
 </p:sld>
 </file>
 
-<file path=ppt/slides/slide11.xml><?xml version="1.0" encoding="utf-8"?>
+<file path=ppt/slides/slide12.xml><?xml version="1.0" encoding="utf-8"?>
 <p:sld xmlns:a="http://schemas.openxmlformats.org/drawingml/2006/main" xmlns:r="http://schemas.openxmlformats.org/officeDocument/2006/relationships" xmlns:p="http://schemas.openxmlformats.org/presentationml/2006/main">
   <p:cSld>
     <p:spTree>
@@ -3701,143 +3791,6 @@
     <p:extLst>
       <p:ext uri="{BB962C8B-B14F-4D97-AF65-F5344CB8AC3E}">
         <p14:creationId xmlns:p14="http://schemas.microsoft.com/office/powerpoint/2010/main" val="265594749"/>
-      </p:ext>
-    </p:extLst>
-  </p:cSld>
-  <p:clrMapOvr>
-    <a:masterClrMapping/>
-  </p:clrMapOvr>
-</p:sld>
-</file>
-
-<file path=ppt/slides/slide12.xml><?xml version="1.0" encoding="utf-8"?>
-<p:sld xmlns:a="http://schemas.openxmlformats.org/drawingml/2006/main" xmlns:r="http://schemas.openxmlformats.org/officeDocument/2006/relationships" xmlns:p="http://schemas.openxmlformats.org/presentationml/2006/main">
-  <p:cSld>
-    <p:spTree>
-      <p:nvGrpSpPr>
-        <p:cNvPr id="1" name=""/>
-        <p:cNvGrpSpPr/>
-        <p:nvPr/>
-      </p:nvGrpSpPr>
-      <p:grpSpPr>
-        <a:xfrm>
-          <a:off x="0" y="0"/>
-          <a:ext cx="0" cy="0"/>
-          <a:chOff x="0" y="0"/>
-          <a:chExt cx="0" cy="0"/>
-        </a:xfrm>
-      </p:grpSpPr>
-      <p:sp>
-        <p:nvSpPr>
-          <p:cNvPr id="2" name="Title 1">
-            <a:extLst>
-              <a:ext uri="{FF2B5EF4-FFF2-40B4-BE49-F238E27FC236}">
-                <a16:creationId xmlns:a16="http://schemas.microsoft.com/office/drawing/2014/main" id="{76B52312-3381-6342-9077-8251CECC760A}"/>
-              </a:ext>
-            </a:extLst>
-          </p:cNvPr>
-          <p:cNvSpPr>
-            <a:spLocks noGrp="1"/>
-          </p:cNvSpPr>
-          <p:nvPr>
-            <p:ph type="title"/>
-          </p:nvPr>
-        </p:nvSpPr>
-        <p:spPr/>
-        <p:txBody>
-          <a:bodyPr/>
-          <a:lstStyle/>
-          <a:p>
-            <a:r>
-              <a:rPr lang="en-US" dirty="0" err="1"/>
-              <a:t>CSV.new</a:t>
-            </a:r>
-            <a:r>
-              <a:rPr lang="en-US" dirty="0"/>
-              <a:t>()</a:t>
-            </a:r>
-          </a:p>
-        </p:txBody>
-      </p:sp>
-      <p:sp>
-        <p:nvSpPr>
-          <p:cNvPr id="3" name="Content Placeholder 2">
-            <a:extLst>
-              <a:ext uri="{FF2B5EF4-FFF2-40B4-BE49-F238E27FC236}">
-                <a16:creationId xmlns:a16="http://schemas.microsoft.com/office/drawing/2014/main" id="{33C4E901-5714-4241-BD4D-63158AECFE04}"/>
-              </a:ext>
-            </a:extLst>
-          </p:cNvPr>
-          <p:cNvSpPr>
-            <a:spLocks noGrp="1"/>
-          </p:cNvSpPr>
-          <p:nvPr>
-            <p:ph idx="1"/>
-          </p:nvPr>
-        </p:nvSpPr>
-        <p:spPr/>
-        <p:txBody>
-          <a:bodyPr/>
-          <a:lstStyle/>
-          <a:p>
-            <a:r>
-              <a:rPr lang="en-US" dirty="0"/>
-              <a:t>Basic constructor</a:t>
-            </a:r>
-          </a:p>
-          <a:p>
-            <a:r>
-              <a:rPr lang="en-US" dirty="0"/>
-              <a:t>Used internally by .foreach .read, and .open (for formatting)</a:t>
-            </a:r>
-          </a:p>
-          <a:p>
-            <a:r>
-              <a:rPr lang="en-US" dirty="0"/>
-              <a:t>Takes IO input</a:t>
-            </a:r>
-          </a:p>
-          <a:p>
-            <a:pPr lvl="1"/>
-            <a:r>
-              <a:rPr lang="en-US" dirty="0"/>
-              <a:t>Raw string</a:t>
-            </a:r>
-          </a:p>
-          <a:p>
-            <a:pPr lvl="1"/>
-            <a:r>
-              <a:rPr lang="en-US" dirty="0" err="1"/>
-              <a:t>StringIO</a:t>
-            </a:r>
-            <a:r>
-              <a:rPr lang="en-US" dirty="0"/>
-              <a:t> object</a:t>
-            </a:r>
-          </a:p>
-          <a:p>
-            <a:pPr lvl="1"/>
-            <a:r>
-              <a:rPr lang="en-US" dirty="0"/>
-              <a:t>File handle</a:t>
-            </a:r>
-          </a:p>
-          <a:p>
-            <a:pPr lvl="1"/>
-            <a:endParaRPr lang="en-US" dirty="0"/>
-          </a:p>
-          <a:p>
-            <a:r>
-              <a:rPr lang="en-US" dirty="0"/>
-              <a:t>CSV is just a glorified wrapper for File in Ruby!</a:t>
-            </a:r>
-          </a:p>
-        </p:txBody>
-      </p:sp>
-    </p:spTree>
-    <p:extLst>
-      <p:ext uri="{BB962C8B-B14F-4D97-AF65-F5344CB8AC3E}">
-        <p14:creationId xmlns:p14="http://schemas.microsoft.com/office/powerpoint/2010/main" val="2554794605"/>
       </p:ext>
     </p:extLst>
   </p:cSld>
@@ -3869,6 +3822,143 @@
           <p:cNvPr id="2" name="Title 1">
             <a:extLst>
               <a:ext uri="{FF2B5EF4-FFF2-40B4-BE49-F238E27FC236}">
+                <a16:creationId xmlns:a16="http://schemas.microsoft.com/office/drawing/2014/main" id="{76B52312-3381-6342-9077-8251CECC760A}"/>
+              </a:ext>
+            </a:extLst>
+          </p:cNvPr>
+          <p:cNvSpPr>
+            <a:spLocks noGrp="1"/>
+          </p:cNvSpPr>
+          <p:nvPr>
+            <p:ph type="title"/>
+          </p:nvPr>
+        </p:nvSpPr>
+        <p:spPr/>
+        <p:txBody>
+          <a:bodyPr/>
+          <a:lstStyle/>
+          <a:p>
+            <a:r>
+              <a:rPr lang="en-US" dirty="0" err="1"/>
+              <a:t>CSV.new</a:t>
+            </a:r>
+            <a:r>
+              <a:rPr lang="en-US" dirty="0"/>
+              <a:t>()</a:t>
+            </a:r>
+          </a:p>
+        </p:txBody>
+      </p:sp>
+      <p:sp>
+        <p:nvSpPr>
+          <p:cNvPr id="3" name="Content Placeholder 2">
+            <a:extLst>
+              <a:ext uri="{FF2B5EF4-FFF2-40B4-BE49-F238E27FC236}">
+                <a16:creationId xmlns:a16="http://schemas.microsoft.com/office/drawing/2014/main" id="{33C4E901-5714-4241-BD4D-63158AECFE04}"/>
+              </a:ext>
+            </a:extLst>
+          </p:cNvPr>
+          <p:cNvSpPr>
+            <a:spLocks noGrp="1"/>
+          </p:cNvSpPr>
+          <p:nvPr>
+            <p:ph idx="1"/>
+          </p:nvPr>
+        </p:nvSpPr>
+        <p:spPr/>
+        <p:txBody>
+          <a:bodyPr/>
+          <a:lstStyle/>
+          <a:p>
+            <a:r>
+              <a:rPr lang="en-US" dirty="0"/>
+              <a:t>Basic constructor</a:t>
+            </a:r>
+          </a:p>
+          <a:p>
+            <a:r>
+              <a:rPr lang="en-US" dirty="0"/>
+              <a:t>Used internally by .foreach .read, and .open (for formatting)</a:t>
+            </a:r>
+          </a:p>
+          <a:p>
+            <a:r>
+              <a:rPr lang="en-US" dirty="0"/>
+              <a:t>Takes IO input</a:t>
+            </a:r>
+          </a:p>
+          <a:p>
+            <a:pPr lvl="1"/>
+            <a:r>
+              <a:rPr lang="en-US" dirty="0"/>
+              <a:t>Raw string</a:t>
+            </a:r>
+          </a:p>
+          <a:p>
+            <a:pPr lvl="1"/>
+            <a:r>
+              <a:rPr lang="en-US" dirty="0" err="1"/>
+              <a:t>StringIO</a:t>
+            </a:r>
+            <a:r>
+              <a:rPr lang="en-US" dirty="0"/>
+              <a:t> object</a:t>
+            </a:r>
+          </a:p>
+          <a:p>
+            <a:pPr lvl="1"/>
+            <a:r>
+              <a:rPr lang="en-US" dirty="0"/>
+              <a:t>File handle</a:t>
+            </a:r>
+          </a:p>
+          <a:p>
+            <a:pPr lvl="1"/>
+            <a:endParaRPr lang="en-US" dirty="0"/>
+          </a:p>
+          <a:p>
+            <a:r>
+              <a:rPr lang="en-US" dirty="0"/>
+              <a:t>CSV is just a glorified wrapper for File in Ruby!</a:t>
+            </a:r>
+          </a:p>
+        </p:txBody>
+      </p:sp>
+    </p:spTree>
+    <p:extLst>
+      <p:ext uri="{BB962C8B-B14F-4D97-AF65-F5344CB8AC3E}">
+        <p14:creationId xmlns:p14="http://schemas.microsoft.com/office/powerpoint/2010/main" val="2554794605"/>
+      </p:ext>
+    </p:extLst>
+  </p:cSld>
+  <p:clrMapOvr>
+    <a:masterClrMapping/>
+  </p:clrMapOvr>
+</p:sld>
+</file>
+
+<file path=ppt/slides/slide14.xml><?xml version="1.0" encoding="utf-8"?>
+<p:sld xmlns:a="http://schemas.openxmlformats.org/drawingml/2006/main" xmlns:r="http://schemas.openxmlformats.org/officeDocument/2006/relationships" xmlns:p="http://schemas.openxmlformats.org/presentationml/2006/main">
+  <p:cSld>
+    <p:spTree>
+      <p:nvGrpSpPr>
+        <p:cNvPr id="1" name=""/>
+        <p:cNvGrpSpPr/>
+        <p:nvPr/>
+      </p:nvGrpSpPr>
+      <p:grpSpPr>
+        <a:xfrm>
+          <a:off x="0" y="0"/>
+          <a:ext cx="0" cy="0"/>
+          <a:chOff x="0" y="0"/>
+          <a:chExt cx="0" cy="0"/>
+        </a:xfrm>
+      </p:grpSpPr>
+      <p:sp>
+        <p:nvSpPr>
+          <p:cNvPr id="2" name="Title 1">
+            <a:extLst>
+              <a:ext uri="{FF2B5EF4-FFF2-40B4-BE49-F238E27FC236}">
                 <a16:creationId xmlns:a16="http://schemas.microsoft.com/office/drawing/2014/main" id="{F32D9AD3-6E9D-1645-B46C-7F9FF0A03CCC}"/>
               </a:ext>
             </a:extLst>
@@ -4323,7 +4413,7 @@
 </p:sld>
 </file>
 
-<file path=ppt/slides/slide14.xml><?xml version="1.0" encoding="utf-8"?>
+<file path=ppt/slides/slide15.xml><?xml version="1.0" encoding="utf-8"?>
 <p:sld xmlns:a="http://schemas.openxmlformats.org/drawingml/2006/main" xmlns:r="http://schemas.openxmlformats.org/officeDocument/2006/relationships" xmlns:p="http://schemas.openxmlformats.org/presentationml/2006/main">
   <p:cSld>
     <p:spTree>
@@ -4383,7 +4473,136 @@
 </p:sld>
 </file>
 
-<file path=ppt/slides/slide15.xml><?xml version="1.0" encoding="utf-8"?>
+<file path=ppt/slides/slide16.xml><?xml version="1.0" encoding="utf-8"?>
+<p:sld xmlns:a="http://schemas.openxmlformats.org/drawingml/2006/main" xmlns:r="http://schemas.openxmlformats.org/officeDocument/2006/relationships" xmlns:p="http://schemas.openxmlformats.org/presentationml/2006/main">
+  <p:cSld>
+    <p:spTree>
+      <p:nvGrpSpPr>
+        <p:cNvPr id="1" name=""/>
+        <p:cNvGrpSpPr/>
+        <p:nvPr/>
+      </p:nvGrpSpPr>
+      <p:grpSpPr>
+        <a:xfrm>
+          <a:off x="0" y="0"/>
+          <a:ext cx="0" cy="0"/>
+          <a:chOff x="0" y="0"/>
+          <a:chExt cx="0" cy="0"/>
+        </a:xfrm>
+      </p:grpSpPr>
+      <p:sp>
+        <p:nvSpPr>
+          <p:cNvPr id="2" name="Title 1">
+            <a:extLst>
+              <a:ext uri="{FF2B5EF4-FFF2-40B4-BE49-F238E27FC236}">
+                <a16:creationId xmlns:a16="http://schemas.microsoft.com/office/drawing/2014/main" id="{2BB8F225-A390-2143-80B4-AC8403FBBF99}"/>
+              </a:ext>
+            </a:extLst>
+          </p:cNvPr>
+          <p:cNvSpPr>
+            <a:spLocks noGrp="1"/>
+          </p:cNvSpPr>
+          <p:nvPr>
+            <p:ph type="title"/>
+          </p:nvPr>
+        </p:nvSpPr>
+        <p:spPr/>
+        <p:txBody>
+          <a:bodyPr/>
+          <a:lstStyle/>
+          <a:p>
+            <a:r>
+              <a:rPr lang="en-US" dirty="0"/>
+              <a:t>Final Notes</a:t>
+            </a:r>
+          </a:p>
+        </p:txBody>
+      </p:sp>
+      <p:sp>
+        <p:nvSpPr>
+          <p:cNvPr id="3" name="Content Placeholder 2">
+            <a:extLst>
+              <a:ext uri="{FF2B5EF4-FFF2-40B4-BE49-F238E27FC236}">
+                <a16:creationId xmlns:a16="http://schemas.microsoft.com/office/drawing/2014/main" id="{563FADF0-2982-2143-9779-B366092D2F6A}"/>
+              </a:ext>
+            </a:extLst>
+          </p:cNvPr>
+          <p:cNvSpPr>
+            <a:spLocks noGrp="1"/>
+          </p:cNvSpPr>
+          <p:nvPr>
+            <p:ph idx="1"/>
+          </p:nvPr>
+        </p:nvSpPr>
+        <p:spPr/>
+        <p:txBody>
+          <a:bodyPr/>
+          <a:lstStyle/>
+          <a:p>
+            <a:r>
+              <a:rPr lang="en-US" dirty="0"/>
+              <a:t>It’s all or nothing - Your files must be valid</a:t>
+            </a:r>
+          </a:p>
+          <a:p>
+            <a:pPr lvl="1"/>
+            <a:r>
+              <a:rPr lang="en-US" dirty="0"/>
+              <a:t>Consistent line endings</a:t>
+            </a:r>
+          </a:p>
+          <a:p>
+            <a:pPr lvl="1"/>
+            <a:r>
+              <a:rPr lang="en-US" dirty="0"/>
+              <a:t>Must have actual line endings</a:t>
+            </a:r>
+          </a:p>
+          <a:p>
+            <a:pPr lvl="1"/>
+            <a:r>
+              <a:rPr lang="en-US" dirty="0"/>
+              <a:t>Properly escaped values</a:t>
+            </a:r>
+          </a:p>
+          <a:p>
+            <a:endParaRPr lang="en-US" dirty="0"/>
+          </a:p>
+          <a:p>
+            <a:r>
+              <a:rPr lang="en-US" dirty="0"/>
+              <a:t>Read the documentation!</a:t>
+            </a:r>
+          </a:p>
+          <a:p>
+            <a:pPr lvl="1"/>
+            <a:r>
+              <a:rPr lang="en-US" dirty="0">
+                <a:hlinkClick r:id="rId2"/>
+              </a:rPr>
+              <a:t>http://ruby-doc.org/stdlib-2.5.1/libdoc/csv/rdoc/CSV.html</a:t>
+            </a:r>
+            <a:r>
+              <a:rPr lang="en-US" dirty="0"/>
+              <a:t> </a:t>
+            </a:r>
+          </a:p>
+        </p:txBody>
+      </p:sp>
+    </p:spTree>
+    <p:extLst>
+      <p:ext uri="{BB962C8B-B14F-4D97-AF65-F5344CB8AC3E}">
+        <p14:creationId xmlns:p14="http://schemas.microsoft.com/office/powerpoint/2010/main" val="2913204809"/>
+      </p:ext>
+    </p:extLst>
+  </p:cSld>
+  <p:clrMapOvr>
+    <a:masterClrMapping/>
+  </p:clrMapOvr>
+</p:sld>
+</file>
+
+<file path=ppt/slides/slide17.xml><?xml version="1.0" encoding="utf-8"?>
 <p:sld xmlns:a="http://schemas.openxmlformats.org/drawingml/2006/main" xmlns:r="http://schemas.openxmlformats.org/officeDocument/2006/relationships" xmlns:p="http://schemas.openxmlformats.org/presentationml/2006/main">
   <p:cSld>
     <p:spTree>
@@ -6087,7 +6306,7 @@
           <a:p>
             <a:r>
               <a:rPr lang="en-US" dirty="0"/>
-              <a:t>Reading a File (Pipe delimited)</a:t>
+              <a:t>Reading a File (Providing your own headers)</a:t>
             </a:r>
           </a:p>
         </p:txBody>
@@ -6107,7 +6326,7 @@
         <p:spPr>
           <a:xfrm>
             <a:off x="304800" y="1524434"/>
-            <a:ext cx="3766867" cy="2123658"/>
+            <a:ext cx="3766867" cy="1446550"/>
           </a:xfrm>
           <a:prstGeom prst="rect">
             <a:avLst/>
@@ -6129,29 +6348,23 @@
           <a:p>
             <a:r>
               <a:rPr lang="en-US" sz="4400" dirty="0"/>
-              <a:t>Head1|Head2</a:t>
+              <a:t>1,2</a:t>
             </a:r>
           </a:p>
           <a:p>
             <a:r>
               <a:rPr lang="en-US" sz="4400" dirty="0"/>
-              <a:t>1|2</a:t>
-            </a:r>
-          </a:p>
-          <a:p>
-            <a:r>
-              <a:rPr lang="en-US" sz="4400" dirty="0"/>
-              <a:t>2|3</a:t>
+              <a:t>2,3</a:t>
             </a:r>
           </a:p>
         </p:txBody>
       </p:sp>
       <p:pic>
         <p:nvPicPr>
-          <p:cNvPr id="20" name="Picture 19">
-            <a:extLst>
-              <a:ext uri="{FF2B5EF4-FFF2-40B4-BE49-F238E27FC236}">
-                <a16:creationId xmlns:a16="http://schemas.microsoft.com/office/drawing/2014/main" id="{08742774-7616-DA43-BF1A-0DCF8410A957}"/>
+          <p:cNvPr id="7" name="Picture 6">
+            <a:extLst>
+              <a:ext uri="{FF2B5EF4-FFF2-40B4-BE49-F238E27FC236}">
+                <a16:creationId xmlns:a16="http://schemas.microsoft.com/office/drawing/2014/main" id="{3DDF4883-7E19-BB48-A6C6-9D41C7E2A5F7}"/>
               </a:ext>
             </a:extLst>
           </p:cNvPr>
@@ -6168,8 +6381,8 @@
         </p:blipFill>
         <p:spPr>
           <a:xfrm>
-            <a:off x="4477369" y="2098692"/>
-            <a:ext cx="7251700" cy="3098800"/>
+            <a:off x="4598917" y="2247709"/>
+            <a:ext cx="7061200" cy="2603500"/>
           </a:xfrm>
           <a:prstGeom prst="rect">
             <a:avLst/>
@@ -6179,7 +6392,7 @@
     </p:spTree>
     <p:extLst>
       <p:ext uri="{BB962C8B-B14F-4D97-AF65-F5344CB8AC3E}">
-        <p14:creationId xmlns:p14="http://schemas.microsoft.com/office/powerpoint/2010/main" val="4049049218"/>
+        <p14:creationId xmlns:p14="http://schemas.microsoft.com/office/powerpoint/2010/main" val="2370132474"/>
       </p:ext>
     </p:extLst>
   </p:cSld>
@@ -6229,17 +6442,71 @@
           <a:p>
             <a:r>
               <a:rPr lang="en-US" dirty="0"/>
-              <a:t>Reading a File</a:t>
+              <a:t>Reading a File (Pipe delimited)</a:t>
+            </a:r>
+          </a:p>
+        </p:txBody>
+      </p:sp>
+      <p:sp>
+        <p:nvSpPr>
+          <p:cNvPr id="5" name="TextBox 4">
+            <a:extLst>
+              <a:ext uri="{FF2B5EF4-FFF2-40B4-BE49-F238E27FC236}">
+                <a16:creationId xmlns:a16="http://schemas.microsoft.com/office/drawing/2014/main" id="{D1AAD975-46FA-274B-94C3-0C6228BA6668}"/>
+              </a:ext>
+            </a:extLst>
+          </p:cNvPr>
+          <p:cNvSpPr txBox="1"/>
+          <p:nvPr/>
+        </p:nvSpPr>
+        <p:spPr>
+          <a:xfrm>
+            <a:off x="304800" y="1524434"/>
+            <a:ext cx="3766867" cy="2123658"/>
+          </a:xfrm>
+          <a:prstGeom prst="rect">
+            <a:avLst/>
+          </a:prstGeom>
+          <a:solidFill>
+            <a:schemeClr val="bg1"/>
+          </a:solidFill>
+          <a:ln>
+            <a:solidFill>
+              <a:schemeClr val="tx1"/>
+            </a:solidFill>
+          </a:ln>
+        </p:spPr>
+        <p:txBody>
+          <a:bodyPr wrap="square" rtlCol="0">
+            <a:spAutoFit/>
+          </a:bodyPr>
+          <a:lstStyle/>
+          <a:p>
+            <a:r>
+              <a:rPr lang="en-US" sz="4400" dirty="0"/>
+              <a:t>Head1|Head2</a:t>
+            </a:r>
+          </a:p>
+          <a:p>
+            <a:r>
+              <a:rPr lang="en-US" sz="4400" dirty="0"/>
+              <a:t>1|2</a:t>
+            </a:r>
+          </a:p>
+          <a:p>
+            <a:r>
+              <a:rPr lang="en-US" sz="4400" dirty="0"/>
+              <a:t>2|3</a:t>
             </a:r>
           </a:p>
         </p:txBody>
       </p:sp>
       <p:pic>
         <p:nvPicPr>
-          <p:cNvPr id="8" name="Picture 7">
-            <a:extLst>
-              <a:ext uri="{FF2B5EF4-FFF2-40B4-BE49-F238E27FC236}">
-                <a16:creationId xmlns:a16="http://schemas.microsoft.com/office/drawing/2014/main" id="{8BF0EF9F-5D2B-6040-B9C2-84563DA8FD26}"/>
+          <p:cNvPr id="20" name="Picture 19">
+            <a:extLst>
+              <a:ext uri="{FF2B5EF4-FFF2-40B4-BE49-F238E27FC236}">
+                <a16:creationId xmlns:a16="http://schemas.microsoft.com/office/drawing/2014/main" id="{08742774-7616-DA43-BF1A-0DCF8410A957}"/>
               </a:ext>
             </a:extLst>
           </p:cNvPr>
@@ -6256,8 +6523,8 @@
         </p:blipFill>
         <p:spPr>
           <a:xfrm>
-            <a:off x="1560782" y="2245384"/>
-            <a:ext cx="8242300" cy="2781300"/>
+            <a:off x="4477369" y="2098692"/>
+            <a:ext cx="7251700" cy="3098800"/>
           </a:xfrm>
           <a:prstGeom prst="rect">
             <a:avLst/>
@@ -6267,7 +6534,7 @@
     </p:spTree>
     <p:extLst>
       <p:ext uri="{BB962C8B-B14F-4D97-AF65-F5344CB8AC3E}">
-        <p14:creationId xmlns:p14="http://schemas.microsoft.com/office/powerpoint/2010/main" val="3172978648"/>
+        <p14:creationId xmlns:p14="http://schemas.microsoft.com/office/powerpoint/2010/main" val="4049049218"/>
       </p:ext>
     </p:extLst>
   </p:cSld>

</xml_diff>